<commit_message>
working with cymetric external metadata
</commit_message>
<xml_diff>
--- a/Yarden.pptx
+++ b/Yarden.pptx
@@ -120,6 +120,9 @@
         </p14:section>
       </p14:sectionLst>
     </p:ext>
+    <p:ext uri="{EFAFB233-063F-42B5-8137-9DF3F51BA10A}">
+      <p15:sldGuideLst xmlns:p15="http://schemas.microsoft.com/office/powerpoint/2012/main"/>
+    </p:ext>
   </p:extLst>
 </p:presentation>
 </file>
@@ -271,7 +274,7 @@
           <a:p>
             <a:fld id="{BED45F2E-F3D0-EF42-AAA8-5B6165EEBC81}" type="datetimeFigureOut">
               <a:rPr lang="en-US" smtClean="0"/>
-              <a:t>9/10/19</a:t>
+              <a:t>9/11/19</a:t>
             </a:fld>
             <a:endParaRPr lang="en-US"/>
           </a:p>
@@ -469,7 +472,7 @@
           <a:p>
             <a:fld id="{BED45F2E-F3D0-EF42-AAA8-5B6165EEBC81}" type="datetimeFigureOut">
               <a:rPr lang="en-US" smtClean="0"/>
-              <a:t>9/10/19</a:t>
+              <a:t>9/11/19</a:t>
             </a:fld>
             <a:endParaRPr lang="en-US"/>
           </a:p>
@@ -677,7 +680,7 @@
           <a:p>
             <a:fld id="{BED45F2E-F3D0-EF42-AAA8-5B6165EEBC81}" type="datetimeFigureOut">
               <a:rPr lang="en-US" smtClean="0"/>
-              <a:t>9/10/19</a:t>
+              <a:t>9/11/19</a:t>
             </a:fld>
             <a:endParaRPr lang="en-US"/>
           </a:p>
@@ -875,7 +878,7 @@
           <a:p>
             <a:fld id="{BED45F2E-F3D0-EF42-AAA8-5B6165EEBC81}" type="datetimeFigureOut">
               <a:rPr lang="en-US" smtClean="0"/>
-              <a:t>9/10/19</a:t>
+              <a:t>9/11/19</a:t>
             </a:fld>
             <a:endParaRPr lang="en-US"/>
           </a:p>
@@ -1150,7 +1153,7 @@
           <a:p>
             <a:fld id="{BED45F2E-F3D0-EF42-AAA8-5B6165EEBC81}" type="datetimeFigureOut">
               <a:rPr lang="en-US" smtClean="0"/>
-              <a:t>9/10/19</a:t>
+              <a:t>9/11/19</a:t>
             </a:fld>
             <a:endParaRPr lang="en-US"/>
           </a:p>
@@ -1415,7 +1418,7 @@
           <a:p>
             <a:fld id="{BED45F2E-F3D0-EF42-AAA8-5B6165EEBC81}" type="datetimeFigureOut">
               <a:rPr lang="en-US" smtClean="0"/>
-              <a:t>9/10/19</a:t>
+              <a:t>9/11/19</a:t>
             </a:fld>
             <a:endParaRPr lang="en-US"/>
           </a:p>
@@ -1827,7 +1830,7 @@
           <a:p>
             <a:fld id="{BED45F2E-F3D0-EF42-AAA8-5B6165EEBC81}" type="datetimeFigureOut">
               <a:rPr lang="en-US" smtClean="0"/>
-              <a:t>9/10/19</a:t>
+              <a:t>9/11/19</a:t>
             </a:fld>
             <a:endParaRPr lang="en-US"/>
           </a:p>
@@ -1968,7 +1971,7 @@
           <a:p>
             <a:fld id="{BED45F2E-F3D0-EF42-AAA8-5B6165EEBC81}" type="datetimeFigureOut">
               <a:rPr lang="en-US" smtClean="0"/>
-              <a:t>9/10/19</a:t>
+              <a:t>9/11/19</a:t>
             </a:fld>
             <a:endParaRPr lang="en-US"/>
           </a:p>
@@ -2081,7 +2084,7 @@
           <a:p>
             <a:fld id="{BED45F2E-F3D0-EF42-AAA8-5B6165EEBC81}" type="datetimeFigureOut">
               <a:rPr lang="en-US" smtClean="0"/>
-              <a:t>9/10/19</a:t>
+              <a:t>9/11/19</a:t>
             </a:fld>
             <a:endParaRPr lang="en-US"/>
           </a:p>
@@ -2392,7 +2395,7 @@
           <a:p>
             <a:fld id="{BED45F2E-F3D0-EF42-AAA8-5B6165EEBC81}" type="datetimeFigureOut">
               <a:rPr lang="en-US" smtClean="0"/>
-              <a:t>9/10/19</a:t>
+              <a:t>9/11/19</a:t>
             </a:fld>
             <a:endParaRPr lang="en-US"/>
           </a:p>
@@ -2680,7 +2683,7 @@
           <a:p>
             <a:fld id="{BED45F2E-F3D0-EF42-AAA8-5B6165EEBC81}" type="datetimeFigureOut">
               <a:rPr lang="en-US" smtClean="0"/>
-              <a:t>9/10/19</a:t>
+              <a:t>9/11/19</a:t>
             </a:fld>
             <a:endParaRPr lang="en-US"/>
           </a:p>
@@ -2921,7 +2924,7 @@
           <a:p>
             <a:fld id="{BED45F2E-F3D0-EF42-AAA8-5B6165EEBC81}" type="datetimeFigureOut">
               <a:rPr lang="en-US" smtClean="0"/>
-              <a:t>9/10/19</a:t>
+              <a:t>9/11/19</a:t>
             </a:fld>
             <a:endParaRPr lang="en-US"/>
           </a:p>
@@ -3857,7 +3860,7 @@
             <a:pPr lvl="2"/>
             <a:r>
               <a:rPr lang="en-US" sz="2800" dirty="0"/>
-              <a:t> resource cost</a:t>
+              <a:t>Resource cost</a:t>
             </a:r>
           </a:p>
           <a:p>

</xml_diff>